<commit_message>
Update DEPA Final Project PPT.pptx
</commit_message>
<xml_diff>
--- a/DEPA Final Project PPT.pptx
+++ b/DEPA Final Project PPT.pptx
@@ -5,13 +5,17 @@
     <p:sldMasterId id="2147483673" r:id="rId1"/>
   </p:sldMasterIdLst>
   <p:notesMasterIdLst>
-    <p:notesMasterId r:id="rId6"/>
+    <p:notesMasterId r:id="rId10"/>
   </p:notesMasterIdLst>
   <p:sldIdLst>
     <p:sldId id="256" r:id="rId2"/>
     <p:sldId id="257" r:id="rId3"/>
     <p:sldId id="258" r:id="rId4"/>
     <p:sldId id="262" r:id="rId5"/>
+    <p:sldId id="263" r:id="rId6"/>
+    <p:sldId id="268" r:id="rId7"/>
+    <p:sldId id="267" r:id="rId8"/>
+    <p:sldId id="265" r:id="rId9"/>
   </p:sldIdLst>
   <p:sldSz cx="9144000" cy="5143500" type="screen16x9"/>
   <p:notesSz cx="6858000" cy="9144000"/>
@@ -4142,6 +4146,72 @@
 </p:notes>
 </file>
 
+<file path=ppt/notesSlides/notesSlide4.xml><?xml version="1.0" encoding="utf-8"?>
+<p:notes xmlns:a="http://schemas.openxmlformats.org/drawingml/2006/main" xmlns:r="http://schemas.openxmlformats.org/officeDocument/2006/relationships" xmlns:p="http://schemas.openxmlformats.org/presentationml/2006/main">
+  <p:cSld>
+    <p:spTree>
+      <p:nvGrpSpPr>
+        <p:cNvPr id="1" name=""/>
+        <p:cNvGrpSpPr/>
+        <p:nvPr/>
+      </p:nvGrpSpPr>
+      <p:grpSpPr>
+        <a:xfrm>
+          <a:off x="0" y="0"/>
+          <a:ext cx="0" cy="0"/>
+          <a:chOff x="0" y="0"/>
+          <a:chExt cx="0" cy="0"/>
+        </a:xfrm>
+      </p:grpSpPr>
+      <p:sp>
+        <p:nvSpPr>
+          <p:cNvPr id="2" name="Slide Image Placeholder 1"/>
+          <p:cNvSpPr>
+            <a:spLocks noGrp="1" noRot="1" noChangeAspect="1"/>
+          </p:cNvSpPr>
+          <p:nvPr>
+            <p:ph type="sldImg"/>
+          </p:nvPr>
+        </p:nvSpPr>
+        <p:spPr>
+          <a:xfrm>
+            <a:off x="381000" y="685800"/>
+            <a:ext cx="6096000" cy="3429000"/>
+          </a:xfrm>
+        </p:spPr>
+      </p:sp>
+      <p:sp>
+        <p:nvSpPr>
+          <p:cNvPr id="3" name="Notes Placeholder 2"/>
+          <p:cNvSpPr>
+            <a:spLocks noGrp="1"/>
+          </p:cNvSpPr>
+          <p:nvPr>
+            <p:ph type="body" idx="1"/>
+          </p:nvPr>
+        </p:nvSpPr>
+        <p:spPr/>
+        <p:txBody>
+          <a:bodyPr/>
+          <a:lstStyle/>
+          <a:p>
+            <a:endParaRPr lang="en-US" dirty="0"/>
+          </a:p>
+        </p:txBody>
+      </p:sp>
+    </p:spTree>
+    <p:extLst>
+      <p:ext uri="{BB962C8B-B14F-4D97-AF65-F5344CB8AC3E}">
+        <p14:creationId xmlns:p14="http://schemas.microsoft.com/office/powerpoint/2010/main" val="3755637107"/>
+      </p:ext>
+    </p:extLst>
+  </p:cSld>
+  <p:clrMapOvr>
+    <a:masterClrMapping/>
+  </p:clrMapOvr>
+</p:notes>
+</file>
+
 <file path=ppt/slideLayouts/slideLayout1.xml><?xml version="1.0" encoding="utf-8"?>
 <p:sldLayout xmlns:a="http://schemas.openxmlformats.org/drawingml/2006/main" xmlns:r="http://schemas.openxmlformats.org/officeDocument/2006/relationships" xmlns:p="http://schemas.openxmlformats.org/presentationml/2006/main" showMasterSp="0" type="title" preserve="1">
   <p:cSld name="Title Slide">
@@ -5354,7 +5424,7 @@
             <a:fld id="{9334D819-9F07-4261-B09B-9E467E5D9002}" type="datetimeFigureOut">
               <a:rPr lang="en-US" smtClean="0"/>
               <a:pPr/>
-              <a:t>5/6/20</a:t>
+              <a:t>5/17/20</a:t>
             </a:fld>
             <a:endParaRPr lang="en-US" dirty="0"/>
           </a:p>
@@ -5602,7 +5672,7 @@
           <a:p>
             <a:fld id="{9334D819-9F07-4261-B09B-9E467E5D9002}" type="datetimeFigureOut">
               <a:rPr lang="en-US" smtClean="0"/>
-              <a:t>5/6/20</a:t>
+              <a:t>5/17/20</a:t>
             </a:fld>
             <a:endParaRPr lang="en-US" dirty="0"/>
           </a:p>
@@ -5792,7 +5862,7 @@
           <a:p>
             <a:fld id="{9334D819-9F07-4261-B09B-9E467E5D9002}" type="datetimeFigureOut">
               <a:rPr lang="en-US" smtClean="0"/>
-              <a:t>5/6/20</a:t>
+              <a:t>5/17/20</a:t>
             </a:fld>
             <a:endParaRPr lang="en-US" dirty="0"/>
           </a:p>
@@ -6339,7 +6409,7 @@
           <a:p>
             <a:fld id="{9334D819-9F07-4261-B09B-9E467E5D9002}" type="datetimeFigureOut">
               <a:rPr lang="en-US" smtClean="0"/>
-              <a:t>5/6/20</a:t>
+              <a:t>5/17/20</a:t>
             </a:fld>
             <a:endParaRPr lang="en-US" dirty="0"/>
           </a:p>
@@ -6623,7 +6693,7 @@
             <a:fld id="{9334D819-9F07-4261-B09B-9E467E5D9002}" type="datetimeFigureOut">
               <a:rPr lang="en-US" smtClean="0"/>
               <a:pPr/>
-              <a:t>5/6/20</a:t>
+              <a:t>5/17/20</a:t>
             </a:fld>
             <a:endParaRPr lang="en-US" dirty="0"/>
           </a:p>
@@ -7834,7 +7904,7 @@
           <a:p>
             <a:fld id="{9334D819-9F07-4261-B09B-9E467E5D9002}" type="datetimeFigureOut">
               <a:rPr lang="en-US" smtClean="0"/>
-              <a:t>5/6/20</a:t>
+              <a:t>5/17/20</a:t>
             </a:fld>
             <a:endParaRPr lang="en-US" dirty="0"/>
           </a:p>
@@ -8234,7 +8304,7 @@
           <a:p>
             <a:fld id="{9334D819-9F07-4261-B09B-9E467E5D9002}" type="datetimeFigureOut">
               <a:rPr lang="en-US" smtClean="0"/>
-              <a:t>5/6/20</a:t>
+              <a:t>5/17/20</a:t>
             </a:fld>
             <a:endParaRPr lang="en-US" dirty="0"/>
           </a:p>
@@ -8367,7 +8437,7 @@
           <a:p>
             <a:fld id="{9334D819-9F07-4261-B09B-9E467E5D9002}" type="datetimeFigureOut">
               <a:rPr lang="en-US" smtClean="0"/>
-              <a:t>5/6/20</a:t>
+              <a:t>5/17/20</a:t>
             </a:fld>
             <a:endParaRPr lang="en-US" dirty="0"/>
           </a:p>
@@ -8472,7 +8542,7 @@
           <a:p>
             <a:fld id="{9334D819-9F07-4261-B09B-9E467E5D9002}" type="datetimeFigureOut">
               <a:rPr lang="en-US" smtClean="0"/>
-              <a:t>5/6/20</a:t>
+              <a:t>5/17/20</a:t>
             </a:fld>
             <a:endParaRPr lang="en-US" dirty="0"/>
           </a:p>
@@ -9244,7 +9314,7 @@
           <a:p>
             <a:fld id="{9334D819-9F07-4261-B09B-9E467E5D9002}" type="datetimeFigureOut">
               <a:rPr lang="en-US" smtClean="0"/>
-              <a:t>5/6/20</a:t>
+              <a:t>5/17/20</a:t>
             </a:fld>
             <a:endParaRPr lang="en-US" dirty="0"/>
           </a:p>
@@ -10094,7 +10164,7 @@
           <a:p>
             <a:fld id="{9334D819-9F07-4261-B09B-9E467E5D9002}" type="datetimeFigureOut">
               <a:rPr lang="en-US" smtClean="0"/>
-              <a:t>5/6/20</a:t>
+              <a:t>5/17/20</a:t>
             </a:fld>
             <a:endParaRPr lang="en-US" dirty="0"/>
           </a:p>
@@ -10332,7 +10402,7 @@
             <a:fld id="{9334D819-9F07-4261-B09B-9E467E5D9002}" type="datetimeFigureOut">
               <a:rPr lang="en-US" smtClean="0"/>
               <a:pPr/>
-              <a:t>5/6/20</a:t>
+              <a:t>5/17/20</a:t>
             </a:fld>
             <a:endParaRPr lang="en-US" dirty="0"/>
           </a:p>
@@ -20970,6 +21040,2174 @@
 </p:sld>
 </file>
 
+<file path=ppt/slides/slide5.xml><?xml version="1.0" encoding="utf-8"?>
+<p:sld xmlns:a="http://schemas.openxmlformats.org/drawingml/2006/main" xmlns:r="http://schemas.openxmlformats.org/officeDocument/2006/relationships" xmlns:p="http://schemas.openxmlformats.org/presentationml/2006/main">
+  <p:cSld>
+    <p:spTree>
+      <p:nvGrpSpPr>
+        <p:cNvPr id="1" name=""/>
+        <p:cNvGrpSpPr/>
+        <p:nvPr/>
+      </p:nvGrpSpPr>
+      <p:grpSpPr>
+        <a:xfrm>
+          <a:off x="0" y="0"/>
+          <a:ext cx="0" cy="0"/>
+          <a:chOff x="0" y="0"/>
+          <a:chExt cx="0" cy="0"/>
+        </a:xfrm>
+      </p:grpSpPr>
+      <p:sp>
+        <p:nvSpPr>
+          <p:cNvPr id="2" name="Title 1">
+            <a:extLst>
+              <a:ext uri="{FF2B5EF4-FFF2-40B4-BE49-F238E27FC236}">
+                <a16:creationId xmlns:a16="http://schemas.microsoft.com/office/drawing/2014/main" id="{4D84132B-14F2-0646-8F85-99B6FCFCE37D}"/>
+              </a:ext>
+            </a:extLst>
+          </p:cNvPr>
+          <p:cNvSpPr>
+            <a:spLocks noGrp="1"/>
+          </p:cNvSpPr>
+          <p:nvPr>
+            <p:ph type="title"/>
+          </p:nvPr>
+        </p:nvSpPr>
+        <p:spPr>
+          <a:xfrm>
+            <a:off x="623400" y="423759"/>
+            <a:ext cx="8520600" cy="628864"/>
+          </a:xfrm>
+        </p:spPr>
+        <p:txBody>
+          <a:bodyPr/>
+          <a:lstStyle/>
+          <a:p>
+            <a:r>
+              <a:rPr lang="en-US" dirty="0"/>
+              <a:t>DATA PREPARATION</a:t>
+            </a:r>
+          </a:p>
+        </p:txBody>
+      </p:sp>
+      <p:sp>
+        <p:nvSpPr>
+          <p:cNvPr id="3" name="Text Placeholder 2">
+            <a:extLst>
+              <a:ext uri="{FF2B5EF4-FFF2-40B4-BE49-F238E27FC236}">
+                <a16:creationId xmlns:a16="http://schemas.microsoft.com/office/drawing/2014/main" id="{3B85608B-9366-3D41-9D86-3BEBA316FFAD}"/>
+              </a:ext>
+            </a:extLst>
+          </p:cNvPr>
+          <p:cNvSpPr>
+            <a:spLocks noGrp="1"/>
+          </p:cNvSpPr>
+          <p:nvPr>
+            <p:ph type="body" idx="1"/>
+          </p:nvPr>
+        </p:nvSpPr>
+        <p:spPr/>
+        <p:txBody>
+          <a:bodyPr/>
+          <a:lstStyle/>
+          <a:p>
+            <a:r>
+              <a:rPr lang="en-US" dirty="0"/>
+              <a:t>DATA SOURCE</a:t>
+            </a:r>
+          </a:p>
+          <a:p>
+            <a:endParaRPr lang="en-US" dirty="0"/>
+          </a:p>
+          <a:p>
+            <a:endParaRPr lang="en-US" dirty="0"/>
+          </a:p>
+          <a:p>
+            <a:pPr marL="114300" indent="0">
+              <a:buNone/>
+            </a:pPr>
+            <a:endParaRPr lang="en-US" dirty="0"/>
+          </a:p>
+        </p:txBody>
+      </p:sp>
+    </p:spTree>
+    <p:extLst>
+      <p:ext uri="{BB962C8B-B14F-4D97-AF65-F5344CB8AC3E}">
+        <p14:creationId xmlns:p14="http://schemas.microsoft.com/office/powerpoint/2010/main" val="1881765150"/>
+      </p:ext>
+    </p:extLst>
+  </p:cSld>
+  <p:clrMapOvr>
+    <a:masterClrMapping/>
+  </p:clrMapOvr>
+</p:sld>
+</file>
+
+<file path=ppt/slides/slide6.xml><?xml version="1.0" encoding="utf-8"?>
+<p:sld xmlns:a="http://schemas.openxmlformats.org/drawingml/2006/main" xmlns:r="http://schemas.openxmlformats.org/officeDocument/2006/relationships" xmlns:p="http://schemas.openxmlformats.org/presentationml/2006/main">
+  <p:cSld>
+    <p:spTree>
+      <p:nvGrpSpPr>
+        <p:cNvPr id="1" name=""/>
+        <p:cNvGrpSpPr/>
+        <p:nvPr/>
+      </p:nvGrpSpPr>
+      <p:grpSpPr>
+        <a:xfrm>
+          <a:off x="0" y="0"/>
+          <a:ext cx="0" cy="0"/>
+          <a:chOff x="0" y="0"/>
+          <a:chExt cx="0" cy="0"/>
+        </a:xfrm>
+      </p:grpSpPr>
+      <p:sp>
+        <p:nvSpPr>
+          <p:cNvPr id="2" name="Title 1">
+            <a:extLst>
+              <a:ext uri="{FF2B5EF4-FFF2-40B4-BE49-F238E27FC236}">
+                <a16:creationId xmlns:a16="http://schemas.microsoft.com/office/drawing/2014/main" id="{229FF883-FBB8-0F4F-BF9C-68EF4BE308BA}"/>
+              </a:ext>
+            </a:extLst>
+          </p:cNvPr>
+          <p:cNvSpPr>
+            <a:spLocks noGrp="1"/>
+          </p:cNvSpPr>
+          <p:nvPr>
+            <p:ph type="title"/>
+          </p:nvPr>
+        </p:nvSpPr>
+        <p:spPr>
+          <a:xfrm>
+            <a:off x="623400" y="434393"/>
+            <a:ext cx="8520600" cy="572700"/>
+          </a:xfrm>
+        </p:spPr>
+        <p:txBody>
+          <a:bodyPr/>
+          <a:lstStyle/>
+          <a:p>
+            <a:r>
+              <a:rPr lang="en-US" dirty="0"/>
+              <a:t>DATA MODELING</a:t>
+            </a:r>
+          </a:p>
+        </p:txBody>
+      </p:sp>
+      <p:sp>
+        <p:nvSpPr>
+          <p:cNvPr id="4" name="Text Placeholder 2">
+            <a:extLst>
+              <a:ext uri="{FF2B5EF4-FFF2-40B4-BE49-F238E27FC236}">
+                <a16:creationId xmlns:a16="http://schemas.microsoft.com/office/drawing/2014/main" id="{4555957F-DF63-5E43-807C-992851D78D74}"/>
+              </a:ext>
+            </a:extLst>
+          </p:cNvPr>
+          <p:cNvSpPr txBox="1">
+            <a:spLocks/>
+          </p:cNvSpPr>
+          <p:nvPr/>
+        </p:nvSpPr>
+        <p:spPr>
+          <a:xfrm>
+            <a:off x="464100" y="1007093"/>
+            <a:ext cx="8520600" cy="3416400"/>
+          </a:xfrm>
+          <a:prstGeom prst="rect">
+            <a:avLst/>
+          </a:prstGeom>
+        </p:spPr>
+        <p:txBody>
+          <a:bodyPr spcFirstLastPara="1" vert="horz" wrap="square" lIns="91425" tIns="91425" rIns="91425" bIns="91425" rtlCol="0" anchor="t" anchorCtr="0">
+            <a:noAutofit/>
+          </a:bodyPr>
+          <a:lstStyle>
+            <a:lvl1pPr marL="457200" lvl="0" indent="-342900" algn="l" defTabSz="685800" rtl="0" eaLnBrk="1" latinLnBrk="0" hangingPunct="1">
+              <a:lnSpc>
+                <a:spcPct val="110000"/>
+              </a:lnSpc>
+              <a:spcBef>
+                <a:spcPts val="0"/>
+              </a:spcBef>
+              <a:spcAft>
+                <a:spcPts val="0"/>
+              </a:spcAft>
+              <a:buClr>
+                <a:schemeClr val="tx2"/>
+              </a:buClr>
+              <a:buSzPts val="1800"/>
+              <a:buFont typeface="Arial" panose="020B0604020202020204" pitchFamily="34" charset="0"/>
+              <a:buChar char="●"/>
+              <a:defRPr sz="1500" kern="1200">
+                <a:solidFill>
+                  <a:schemeClr val="tx1">
+                    <a:lumMod val="65000"/>
+                    <a:lumOff val="35000"/>
+                  </a:schemeClr>
+                </a:solidFill>
+                <a:latin typeface="+mn-lt"/>
+                <a:ea typeface="+mn-ea"/>
+                <a:cs typeface="+mn-cs"/>
+              </a:defRPr>
+            </a:lvl1pPr>
+            <a:lvl2pPr marL="914400" lvl="1" indent="-317500" algn="l" defTabSz="685800" rtl="0" eaLnBrk="1" latinLnBrk="0" hangingPunct="1">
+              <a:lnSpc>
+                <a:spcPct val="110000"/>
+              </a:lnSpc>
+              <a:spcBef>
+                <a:spcPts val="1600"/>
+              </a:spcBef>
+              <a:spcAft>
+                <a:spcPts val="0"/>
+              </a:spcAft>
+              <a:buClr>
+                <a:schemeClr val="tx2"/>
+              </a:buClr>
+              <a:buSzPts val="1400"/>
+              <a:buFont typeface="Gill Sans MT" panose="020B0502020104020203" pitchFamily="34" charset="0"/>
+              <a:buChar char="○"/>
+              <a:defRPr sz="1350" kern="1200">
+                <a:solidFill>
+                  <a:schemeClr val="tx1">
+                    <a:lumMod val="65000"/>
+                    <a:lumOff val="35000"/>
+                  </a:schemeClr>
+                </a:solidFill>
+                <a:latin typeface="+mn-lt"/>
+                <a:ea typeface="+mn-ea"/>
+                <a:cs typeface="+mn-cs"/>
+              </a:defRPr>
+            </a:lvl2pPr>
+            <a:lvl3pPr marL="1371600" lvl="2" indent="-317500" algn="l" defTabSz="685800" rtl="0" eaLnBrk="1" latinLnBrk="0" hangingPunct="1">
+              <a:lnSpc>
+                <a:spcPct val="110000"/>
+              </a:lnSpc>
+              <a:spcBef>
+                <a:spcPts val="1600"/>
+              </a:spcBef>
+              <a:spcAft>
+                <a:spcPts val="0"/>
+              </a:spcAft>
+              <a:buClr>
+                <a:schemeClr val="tx2"/>
+              </a:buClr>
+              <a:buSzPts val="1400"/>
+              <a:buFont typeface="Arial" panose="020B0604020202020204" pitchFamily="34" charset="0"/>
+              <a:buChar char="■"/>
+              <a:defRPr sz="1200" kern="1200">
+                <a:solidFill>
+                  <a:schemeClr val="tx1">
+                    <a:lumMod val="65000"/>
+                    <a:lumOff val="35000"/>
+                  </a:schemeClr>
+                </a:solidFill>
+                <a:latin typeface="+mn-lt"/>
+                <a:ea typeface="+mn-ea"/>
+                <a:cs typeface="+mn-cs"/>
+              </a:defRPr>
+            </a:lvl3pPr>
+            <a:lvl4pPr marL="1828800" lvl="3" indent="-317500" algn="l" defTabSz="685800" rtl="0" eaLnBrk="1" latinLnBrk="0" hangingPunct="1">
+              <a:lnSpc>
+                <a:spcPct val="110000"/>
+              </a:lnSpc>
+              <a:spcBef>
+                <a:spcPts val="1600"/>
+              </a:spcBef>
+              <a:spcAft>
+                <a:spcPts val="0"/>
+              </a:spcAft>
+              <a:buClr>
+                <a:schemeClr val="tx2"/>
+              </a:buClr>
+              <a:buSzPts val="1400"/>
+              <a:buFont typeface="Gill Sans MT" panose="020B0502020104020203" pitchFamily="34" charset="0"/>
+              <a:buChar char="●"/>
+              <a:defRPr sz="1050" kern="1200">
+                <a:solidFill>
+                  <a:schemeClr val="tx1">
+                    <a:lumMod val="65000"/>
+                    <a:lumOff val="35000"/>
+                  </a:schemeClr>
+                </a:solidFill>
+                <a:latin typeface="+mn-lt"/>
+                <a:ea typeface="+mn-ea"/>
+                <a:cs typeface="+mn-cs"/>
+              </a:defRPr>
+            </a:lvl4pPr>
+            <a:lvl5pPr marL="2286000" lvl="4" indent="-317500" algn="l" defTabSz="685800" rtl="0" eaLnBrk="1" latinLnBrk="0" hangingPunct="1">
+              <a:lnSpc>
+                <a:spcPct val="110000"/>
+              </a:lnSpc>
+              <a:spcBef>
+                <a:spcPts val="1600"/>
+              </a:spcBef>
+              <a:spcAft>
+                <a:spcPts val="0"/>
+              </a:spcAft>
+              <a:buClr>
+                <a:schemeClr val="tx2"/>
+              </a:buClr>
+              <a:buSzPts val="1400"/>
+              <a:buFont typeface="Arial" panose="020B0604020202020204" pitchFamily="34" charset="0"/>
+              <a:buChar char="○"/>
+              <a:defRPr sz="1050" kern="1200">
+                <a:solidFill>
+                  <a:schemeClr val="tx1">
+                    <a:lumMod val="65000"/>
+                    <a:lumOff val="35000"/>
+                  </a:schemeClr>
+                </a:solidFill>
+                <a:latin typeface="+mn-lt"/>
+                <a:ea typeface="+mn-ea"/>
+                <a:cs typeface="+mn-cs"/>
+              </a:defRPr>
+            </a:lvl5pPr>
+            <a:lvl6pPr marL="2743200" lvl="5" indent="-317500" algn="l" defTabSz="685800" rtl="0" eaLnBrk="1" latinLnBrk="0" hangingPunct="1">
+              <a:lnSpc>
+                <a:spcPct val="110000"/>
+              </a:lnSpc>
+              <a:spcBef>
+                <a:spcPts val="1600"/>
+              </a:spcBef>
+              <a:spcAft>
+                <a:spcPts val="0"/>
+              </a:spcAft>
+              <a:buClr>
+                <a:schemeClr val="tx2"/>
+              </a:buClr>
+              <a:buSzPts val="1400"/>
+              <a:buFont typeface="Gill Sans MT" panose="020B0502020104020203" pitchFamily="34" charset="0"/>
+              <a:buChar char="■"/>
+              <a:defRPr sz="1050" kern="1200">
+                <a:solidFill>
+                  <a:schemeClr val="tx1">
+                    <a:lumMod val="65000"/>
+                    <a:lumOff val="35000"/>
+                  </a:schemeClr>
+                </a:solidFill>
+                <a:latin typeface="+mn-lt"/>
+                <a:ea typeface="+mn-ea"/>
+                <a:cs typeface="+mn-cs"/>
+              </a:defRPr>
+            </a:lvl6pPr>
+            <a:lvl7pPr marL="3200400" lvl="6" indent="-317500" algn="l" defTabSz="685800" rtl="0" eaLnBrk="1" latinLnBrk="0" hangingPunct="1">
+              <a:lnSpc>
+                <a:spcPct val="110000"/>
+              </a:lnSpc>
+              <a:spcBef>
+                <a:spcPts val="1600"/>
+              </a:spcBef>
+              <a:spcAft>
+                <a:spcPts val="0"/>
+              </a:spcAft>
+              <a:buClr>
+                <a:schemeClr val="tx2"/>
+              </a:buClr>
+              <a:buSzPts val="1400"/>
+              <a:buFont typeface="Arial" panose="020B0604020202020204" pitchFamily="34" charset="0"/>
+              <a:buChar char="●"/>
+              <a:defRPr sz="1050" kern="1200">
+                <a:solidFill>
+                  <a:schemeClr val="tx1">
+                    <a:lumMod val="65000"/>
+                    <a:lumOff val="35000"/>
+                  </a:schemeClr>
+                </a:solidFill>
+                <a:latin typeface="+mn-lt"/>
+                <a:ea typeface="+mn-ea"/>
+                <a:cs typeface="+mn-cs"/>
+              </a:defRPr>
+            </a:lvl7pPr>
+            <a:lvl8pPr marL="3657600" lvl="7" indent="-317500" algn="l" defTabSz="685800" rtl="0" eaLnBrk="1" latinLnBrk="0" hangingPunct="1">
+              <a:lnSpc>
+                <a:spcPct val="110000"/>
+              </a:lnSpc>
+              <a:spcBef>
+                <a:spcPts val="1600"/>
+              </a:spcBef>
+              <a:spcAft>
+                <a:spcPts val="0"/>
+              </a:spcAft>
+              <a:buClr>
+                <a:schemeClr val="tx2"/>
+              </a:buClr>
+              <a:buSzPts val="1400"/>
+              <a:buFont typeface="Gill Sans MT" panose="020B0502020104020203" pitchFamily="34" charset="0"/>
+              <a:buChar char="○"/>
+              <a:defRPr sz="1050" kern="1200" baseline="0">
+                <a:solidFill>
+                  <a:schemeClr val="tx1">
+                    <a:lumMod val="65000"/>
+                    <a:lumOff val="35000"/>
+                  </a:schemeClr>
+                </a:solidFill>
+                <a:latin typeface="+mn-lt"/>
+                <a:ea typeface="+mn-ea"/>
+                <a:cs typeface="+mn-cs"/>
+              </a:defRPr>
+            </a:lvl8pPr>
+            <a:lvl9pPr marL="4114800" lvl="8" indent="-317500" algn="l" defTabSz="685800" rtl="0" eaLnBrk="1" latinLnBrk="0" hangingPunct="1">
+              <a:lnSpc>
+                <a:spcPct val="110000"/>
+              </a:lnSpc>
+              <a:spcBef>
+                <a:spcPts val="1600"/>
+              </a:spcBef>
+              <a:spcAft>
+                <a:spcPts val="1600"/>
+              </a:spcAft>
+              <a:buClr>
+                <a:schemeClr val="tx2"/>
+              </a:buClr>
+              <a:buSzPts val="1400"/>
+              <a:buFont typeface="Arial" panose="020B0604020202020204" pitchFamily="34" charset="0"/>
+              <a:buChar char="■"/>
+              <a:defRPr sz="1050" kern="1200" baseline="0">
+                <a:solidFill>
+                  <a:schemeClr val="tx1">
+                    <a:lumMod val="65000"/>
+                    <a:lumOff val="35000"/>
+                  </a:schemeClr>
+                </a:solidFill>
+                <a:latin typeface="+mn-lt"/>
+                <a:ea typeface="+mn-ea"/>
+                <a:cs typeface="+mn-cs"/>
+              </a:defRPr>
+            </a:lvl9pPr>
+          </a:lstStyle>
+          <a:p>
+            <a:r>
+              <a:rPr lang="en-US" dirty="0"/>
+              <a:t>platform considerations</a:t>
+            </a:r>
+          </a:p>
+          <a:p>
+            <a:r>
+              <a:rPr lang="en-US" sz="1600" dirty="0"/>
+              <a:t>After scraping, we compiled the data into tables, forming the basis of an entity relationship model. </a:t>
+            </a:r>
+            <a:endParaRPr lang="en-US" dirty="0"/>
+          </a:p>
+          <a:p>
+            <a:r>
+              <a:rPr lang="en-US" sz="1600" dirty="0"/>
+              <a:t>▹  Once keys were set, we were then able to create a dimensional model. </a:t>
+            </a:r>
+            <a:endParaRPr lang="en-US" dirty="0"/>
+          </a:p>
+          <a:p>
+            <a:r>
+              <a:rPr lang="en-US" sz="1600" dirty="0"/>
+              <a:t>▹  We wanted to analyze movie performance and other attributes, comparing </a:t>
+            </a:r>
+            <a:endParaRPr lang="en-US" dirty="0"/>
+          </a:p>
+          <a:p>
+            <a:r>
+              <a:rPr lang="en-US" sz="1600" dirty="0"/>
+              <a:t>to their source books: three main tables were created: </a:t>
+            </a:r>
+            <a:endParaRPr lang="en-US" sz="1350" dirty="0"/>
+          </a:p>
+          <a:p>
+            <a:r>
+              <a:rPr lang="en-US" sz="1400" dirty="0"/>
+              <a:t>Movie Book Table(List of movies that were adapted from books and the book titles </a:t>
+            </a:r>
+            <a:endParaRPr lang="en-US" sz="1350" dirty="0"/>
+          </a:p>
+          <a:p>
+            <a:r>
+              <a:rPr lang="en-US" sz="1400" dirty="0"/>
+              <a:t>Movie Table (Director, Rating, Genre, Release Year) </a:t>
+            </a:r>
+          </a:p>
+          <a:p>
+            <a:r>
+              <a:rPr lang="en-US" sz="1400" dirty="0"/>
+              <a:t>Book Table (Author, Rating, Genre, Publication Date) </a:t>
+            </a:r>
+            <a:endParaRPr lang="en-US" dirty="0"/>
+          </a:p>
+          <a:p>
+            <a:endParaRPr lang="en-US" sz="1600" dirty="0"/>
+          </a:p>
+          <a:p>
+            <a:r>
+              <a:rPr lang="en-US" sz="1600" dirty="0"/>
+              <a:t>Further we also wanted to explore relationship between individuals involved in these projects: a personnel table was created. </a:t>
+            </a:r>
+            <a:endParaRPr lang="en-US" dirty="0"/>
+          </a:p>
+          <a:p>
+            <a:pPr marL="114300" indent="0">
+              <a:buFont typeface="Arial" panose="020B0604020202020204" pitchFamily="34" charset="0"/>
+              <a:buNone/>
+            </a:pPr>
+            <a:endParaRPr lang="en-US" dirty="0"/>
+          </a:p>
+        </p:txBody>
+      </p:sp>
+      <p:pic>
+        <p:nvPicPr>
+          <p:cNvPr id="6" name="Picture 5">
+            <a:extLst>
+              <a:ext uri="{FF2B5EF4-FFF2-40B4-BE49-F238E27FC236}">
+                <a16:creationId xmlns:a16="http://schemas.microsoft.com/office/drawing/2014/main" id="{586B2EA5-F4E3-6346-A982-49F3F88AC411}"/>
+              </a:ext>
+            </a:extLst>
+          </p:cNvPr>
+          <p:cNvPicPr>
+            <a:picLocks noChangeAspect="1"/>
+          </p:cNvPicPr>
+          <p:nvPr/>
+        </p:nvPicPr>
+        <p:blipFill>
+          <a:blip r:embed="rId2"/>
+          <a:stretch>
+            <a:fillRect/>
+          </a:stretch>
+        </p:blipFill>
+        <p:spPr>
+          <a:xfrm>
+            <a:off x="6002625" y="434393"/>
+            <a:ext cx="2751703" cy="3416400"/>
+          </a:xfrm>
+          <a:prstGeom prst="rect">
+            <a:avLst/>
+          </a:prstGeom>
+        </p:spPr>
+      </p:pic>
+    </p:spTree>
+    <p:extLst>
+      <p:ext uri="{BB962C8B-B14F-4D97-AF65-F5344CB8AC3E}">
+        <p14:creationId xmlns:p14="http://schemas.microsoft.com/office/powerpoint/2010/main" val="3914863970"/>
+      </p:ext>
+    </p:extLst>
+  </p:cSld>
+  <p:clrMapOvr>
+    <a:masterClrMapping/>
+  </p:clrMapOvr>
+</p:sld>
+</file>
+
+<file path=ppt/slides/slide7.xml><?xml version="1.0" encoding="utf-8"?>
+<p:sld xmlns:a="http://schemas.openxmlformats.org/drawingml/2006/main" xmlns:r="http://schemas.openxmlformats.org/officeDocument/2006/relationships" xmlns:p="http://schemas.openxmlformats.org/presentationml/2006/main">
+  <p:cSld>
+    <p:spTree>
+      <p:nvGrpSpPr>
+        <p:cNvPr id="1" name=""/>
+        <p:cNvGrpSpPr/>
+        <p:nvPr/>
+      </p:nvGrpSpPr>
+      <p:grpSpPr>
+        <a:xfrm>
+          <a:off x="0" y="0"/>
+          <a:ext cx="0" cy="0"/>
+          <a:chOff x="0" y="0"/>
+          <a:chExt cx="0" cy="0"/>
+        </a:xfrm>
+      </p:grpSpPr>
+      <p:sp>
+        <p:nvSpPr>
+          <p:cNvPr id="2" name="Title 1">
+            <a:extLst>
+              <a:ext uri="{FF2B5EF4-FFF2-40B4-BE49-F238E27FC236}">
+                <a16:creationId xmlns:a16="http://schemas.microsoft.com/office/drawing/2014/main" id="{4D84132B-14F2-0646-8F85-99B6FCFCE37D}"/>
+              </a:ext>
+            </a:extLst>
+          </p:cNvPr>
+          <p:cNvSpPr>
+            <a:spLocks noGrp="1"/>
+          </p:cNvSpPr>
+          <p:nvPr>
+            <p:ph type="title"/>
+          </p:nvPr>
+        </p:nvSpPr>
+        <p:spPr>
+          <a:xfrm>
+            <a:off x="623400" y="423759"/>
+            <a:ext cx="8520600" cy="628864"/>
+          </a:xfrm>
+        </p:spPr>
+        <p:txBody>
+          <a:bodyPr/>
+          <a:lstStyle/>
+          <a:p>
+            <a:r>
+              <a:rPr lang="en-US" dirty="0"/>
+              <a:t>DESIGN CONSIDERATIONS</a:t>
+            </a:r>
+          </a:p>
+        </p:txBody>
+      </p:sp>
+      <p:sp>
+        <p:nvSpPr>
+          <p:cNvPr id="5" name="Text Placeholder 2">
+            <a:extLst>
+              <a:ext uri="{FF2B5EF4-FFF2-40B4-BE49-F238E27FC236}">
+                <a16:creationId xmlns:a16="http://schemas.microsoft.com/office/drawing/2014/main" id="{F395D830-C752-154D-A925-979F95241837}"/>
+              </a:ext>
+            </a:extLst>
+          </p:cNvPr>
+          <p:cNvSpPr txBox="1">
+            <a:spLocks/>
+          </p:cNvSpPr>
+          <p:nvPr/>
+        </p:nvSpPr>
+        <p:spPr>
+          <a:xfrm>
+            <a:off x="464100" y="1052623"/>
+            <a:ext cx="8520600" cy="3416400"/>
+          </a:xfrm>
+          <a:prstGeom prst="rect">
+            <a:avLst/>
+          </a:prstGeom>
+        </p:spPr>
+        <p:txBody>
+          <a:bodyPr spcFirstLastPara="1" vert="horz" wrap="square" lIns="91425" tIns="91425" rIns="91425" bIns="91425" rtlCol="0" anchor="t" anchorCtr="0">
+            <a:noAutofit/>
+          </a:bodyPr>
+          <a:lstStyle>
+            <a:lvl1pPr marL="457200" lvl="0" indent="-342900" algn="l" defTabSz="685800" rtl="0" eaLnBrk="1" latinLnBrk="0" hangingPunct="1">
+              <a:lnSpc>
+                <a:spcPct val="110000"/>
+              </a:lnSpc>
+              <a:spcBef>
+                <a:spcPts val="0"/>
+              </a:spcBef>
+              <a:spcAft>
+                <a:spcPts val="0"/>
+              </a:spcAft>
+              <a:buClr>
+                <a:schemeClr val="tx2"/>
+              </a:buClr>
+              <a:buSzPts val="1800"/>
+              <a:buFont typeface="Arial" panose="020B0604020202020204" pitchFamily="34" charset="0"/>
+              <a:buChar char="●"/>
+              <a:defRPr sz="1500" kern="1200">
+                <a:solidFill>
+                  <a:schemeClr val="tx1">
+                    <a:lumMod val="65000"/>
+                    <a:lumOff val="35000"/>
+                  </a:schemeClr>
+                </a:solidFill>
+                <a:latin typeface="+mn-lt"/>
+                <a:ea typeface="+mn-ea"/>
+                <a:cs typeface="+mn-cs"/>
+              </a:defRPr>
+            </a:lvl1pPr>
+            <a:lvl2pPr marL="914400" lvl="1" indent="-317500" algn="l" defTabSz="685800" rtl="0" eaLnBrk="1" latinLnBrk="0" hangingPunct="1">
+              <a:lnSpc>
+                <a:spcPct val="110000"/>
+              </a:lnSpc>
+              <a:spcBef>
+                <a:spcPts val="1600"/>
+              </a:spcBef>
+              <a:spcAft>
+                <a:spcPts val="0"/>
+              </a:spcAft>
+              <a:buClr>
+                <a:schemeClr val="tx2"/>
+              </a:buClr>
+              <a:buSzPts val="1400"/>
+              <a:buFont typeface="Gill Sans MT" panose="020B0502020104020203" pitchFamily="34" charset="0"/>
+              <a:buChar char="○"/>
+              <a:defRPr sz="1350" kern="1200">
+                <a:solidFill>
+                  <a:schemeClr val="tx1">
+                    <a:lumMod val="65000"/>
+                    <a:lumOff val="35000"/>
+                  </a:schemeClr>
+                </a:solidFill>
+                <a:latin typeface="+mn-lt"/>
+                <a:ea typeface="+mn-ea"/>
+                <a:cs typeface="+mn-cs"/>
+              </a:defRPr>
+            </a:lvl2pPr>
+            <a:lvl3pPr marL="1371600" lvl="2" indent="-317500" algn="l" defTabSz="685800" rtl="0" eaLnBrk="1" latinLnBrk="0" hangingPunct="1">
+              <a:lnSpc>
+                <a:spcPct val="110000"/>
+              </a:lnSpc>
+              <a:spcBef>
+                <a:spcPts val="1600"/>
+              </a:spcBef>
+              <a:spcAft>
+                <a:spcPts val="0"/>
+              </a:spcAft>
+              <a:buClr>
+                <a:schemeClr val="tx2"/>
+              </a:buClr>
+              <a:buSzPts val="1400"/>
+              <a:buFont typeface="Arial" panose="020B0604020202020204" pitchFamily="34" charset="0"/>
+              <a:buChar char="■"/>
+              <a:defRPr sz="1200" kern="1200">
+                <a:solidFill>
+                  <a:schemeClr val="tx1">
+                    <a:lumMod val="65000"/>
+                    <a:lumOff val="35000"/>
+                  </a:schemeClr>
+                </a:solidFill>
+                <a:latin typeface="+mn-lt"/>
+                <a:ea typeface="+mn-ea"/>
+                <a:cs typeface="+mn-cs"/>
+              </a:defRPr>
+            </a:lvl3pPr>
+            <a:lvl4pPr marL="1828800" lvl="3" indent="-317500" algn="l" defTabSz="685800" rtl="0" eaLnBrk="1" latinLnBrk="0" hangingPunct="1">
+              <a:lnSpc>
+                <a:spcPct val="110000"/>
+              </a:lnSpc>
+              <a:spcBef>
+                <a:spcPts val="1600"/>
+              </a:spcBef>
+              <a:spcAft>
+                <a:spcPts val="0"/>
+              </a:spcAft>
+              <a:buClr>
+                <a:schemeClr val="tx2"/>
+              </a:buClr>
+              <a:buSzPts val="1400"/>
+              <a:buFont typeface="Gill Sans MT" panose="020B0502020104020203" pitchFamily="34" charset="0"/>
+              <a:buChar char="●"/>
+              <a:defRPr sz="1050" kern="1200">
+                <a:solidFill>
+                  <a:schemeClr val="tx1">
+                    <a:lumMod val="65000"/>
+                    <a:lumOff val="35000"/>
+                  </a:schemeClr>
+                </a:solidFill>
+                <a:latin typeface="+mn-lt"/>
+                <a:ea typeface="+mn-ea"/>
+                <a:cs typeface="+mn-cs"/>
+              </a:defRPr>
+            </a:lvl4pPr>
+            <a:lvl5pPr marL="2286000" lvl="4" indent="-317500" algn="l" defTabSz="685800" rtl="0" eaLnBrk="1" latinLnBrk="0" hangingPunct="1">
+              <a:lnSpc>
+                <a:spcPct val="110000"/>
+              </a:lnSpc>
+              <a:spcBef>
+                <a:spcPts val="1600"/>
+              </a:spcBef>
+              <a:spcAft>
+                <a:spcPts val="0"/>
+              </a:spcAft>
+              <a:buClr>
+                <a:schemeClr val="tx2"/>
+              </a:buClr>
+              <a:buSzPts val="1400"/>
+              <a:buFont typeface="Arial" panose="020B0604020202020204" pitchFamily="34" charset="0"/>
+              <a:buChar char="○"/>
+              <a:defRPr sz="1050" kern="1200">
+                <a:solidFill>
+                  <a:schemeClr val="tx1">
+                    <a:lumMod val="65000"/>
+                    <a:lumOff val="35000"/>
+                  </a:schemeClr>
+                </a:solidFill>
+                <a:latin typeface="+mn-lt"/>
+                <a:ea typeface="+mn-ea"/>
+                <a:cs typeface="+mn-cs"/>
+              </a:defRPr>
+            </a:lvl5pPr>
+            <a:lvl6pPr marL="2743200" lvl="5" indent="-317500" algn="l" defTabSz="685800" rtl="0" eaLnBrk="1" latinLnBrk="0" hangingPunct="1">
+              <a:lnSpc>
+                <a:spcPct val="110000"/>
+              </a:lnSpc>
+              <a:spcBef>
+                <a:spcPts val="1600"/>
+              </a:spcBef>
+              <a:spcAft>
+                <a:spcPts val="0"/>
+              </a:spcAft>
+              <a:buClr>
+                <a:schemeClr val="tx2"/>
+              </a:buClr>
+              <a:buSzPts val="1400"/>
+              <a:buFont typeface="Gill Sans MT" panose="020B0502020104020203" pitchFamily="34" charset="0"/>
+              <a:buChar char="■"/>
+              <a:defRPr sz="1050" kern="1200">
+                <a:solidFill>
+                  <a:schemeClr val="tx1">
+                    <a:lumMod val="65000"/>
+                    <a:lumOff val="35000"/>
+                  </a:schemeClr>
+                </a:solidFill>
+                <a:latin typeface="+mn-lt"/>
+                <a:ea typeface="+mn-ea"/>
+                <a:cs typeface="+mn-cs"/>
+              </a:defRPr>
+            </a:lvl6pPr>
+            <a:lvl7pPr marL="3200400" lvl="6" indent="-317500" algn="l" defTabSz="685800" rtl="0" eaLnBrk="1" latinLnBrk="0" hangingPunct="1">
+              <a:lnSpc>
+                <a:spcPct val="110000"/>
+              </a:lnSpc>
+              <a:spcBef>
+                <a:spcPts val="1600"/>
+              </a:spcBef>
+              <a:spcAft>
+                <a:spcPts val="0"/>
+              </a:spcAft>
+              <a:buClr>
+                <a:schemeClr val="tx2"/>
+              </a:buClr>
+              <a:buSzPts val="1400"/>
+              <a:buFont typeface="Arial" panose="020B0604020202020204" pitchFamily="34" charset="0"/>
+              <a:buChar char="●"/>
+              <a:defRPr sz="1050" kern="1200">
+                <a:solidFill>
+                  <a:schemeClr val="tx1">
+                    <a:lumMod val="65000"/>
+                    <a:lumOff val="35000"/>
+                  </a:schemeClr>
+                </a:solidFill>
+                <a:latin typeface="+mn-lt"/>
+                <a:ea typeface="+mn-ea"/>
+                <a:cs typeface="+mn-cs"/>
+              </a:defRPr>
+            </a:lvl7pPr>
+            <a:lvl8pPr marL="3657600" lvl="7" indent="-317500" algn="l" defTabSz="685800" rtl="0" eaLnBrk="1" latinLnBrk="0" hangingPunct="1">
+              <a:lnSpc>
+                <a:spcPct val="110000"/>
+              </a:lnSpc>
+              <a:spcBef>
+                <a:spcPts val="1600"/>
+              </a:spcBef>
+              <a:spcAft>
+                <a:spcPts val="0"/>
+              </a:spcAft>
+              <a:buClr>
+                <a:schemeClr val="tx2"/>
+              </a:buClr>
+              <a:buSzPts val="1400"/>
+              <a:buFont typeface="Gill Sans MT" panose="020B0502020104020203" pitchFamily="34" charset="0"/>
+              <a:buChar char="○"/>
+              <a:defRPr sz="1050" kern="1200" baseline="0">
+                <a:solidFill>
+                  <a:schemeClr val="tx1">
+                    <a:lumMod val="65000"/>
+                    <a:lumOff val="35000"/>
+                  </a:schemeClr>
+                </a:solidFill>
+                <a:latin typeface="+mn-lt"/>
+                <a:ea typeface="+mn-ea"/>
+                <a:cs typeface="+mn-cs"/>
+              </a:defRPr>
+            </a:lvl8pPr>
+            <a:lvl9pPr marL="4114800" lvl="8" indent="-317500" algn="l" defTabSz="685800" rtl="0" eaLnBrk="1" latinLnBrk="0" hangingPunct="1">
+              <a:lnSpc>
+                <a:spcPct val="110000"/>
+              </a:lnSpc>
+              <a:spcBef>
+                <a:spcPts val="1600"/>
+              </a:spcBef>
+              <a:spcAft>
+                <a:spcPts val="1600"/>
+              </a:spcAft>
+              <a:buClr>
+                <a:schemeClr val="tx2"/>
+              </a:buClr>
+              <a:buSzPts val="1400"/>
+              <a:buFont typeface="Arial" panose="020B0604020202020204" pitchFamily="34" charset="0"/>
+              <a:buChar char="■"/>
+              <a:defRPr sz="1050" kern="1200" baseline="0">
+                <a:solidFill>
+                  <a:schemeClr val="tx1">
+                    <a:lumMod val="65000"/>
+                    <a:lumOff val="35000"/>
+                  </a:schemeClr>
+                </a:solidFill>
+                <a:latin typeface="+mn-lt"/>
+                <a:ea typeface="+mn-ea"/>
+                <a:cs typeface="+mn-cs"/>
+              </a:defRPr>
+            </a:lvl9pPr>
+          </a:lstStyle>
+          <a:p>
+            <a:r>
+              <a:rPr lang="en-US" dirty="0"/>
+              <a:t>Data type for Movie ID, Person ID and </a:t>
+            </a:r>
+            <a:r>
+              <a:rPr lang="en-US" dirty="0" err="1"/>
+              <a:t>Movie_Book_Id</a:t>
+            </a:r>
+            <a:r>
+              <a:rPr lang="en-US" dirty="0"/>
+              <a:t> was defined as INT. Data type for movie ratings and book ratings are defined as string </a:t>
+            </a:r>
+          </a:p>
+          <a:p>
+            <a:r>
+              <a:rPr lang="en-US" dirty="0"/>
+              <a:t>▹ Movie Rating may have NA </a:t>
+            </a:r>
+          </a:p>
+          <a:p>
+            <a:r>
+              <a:rPr lang="en-US" dirty="0"/>
+              <a:t>Data type for movie air date was also defined as string</a:t>
+            </a:r>
+            <a:br>
+              <a:rPr lang="en-US" dirty="0"/>
+            </a:br>
+            <a:r>
+              <a:rPr lang="en-US" dirty="0"/>
+              <a:t>▹ Movie release date may also have the country of release along with the </a:t>
+            </a:r>
+          </a:p>
+          <a:p>
+            <a:r>
+              <a:rPr lang="en-US" dirty="0"/>
+              <a:t>date. </a:t>
+            </a:r>
+          </a:p>
+          <a:p>
+            <a:endParaRPr lang="en-US" dirty="0"/>
+          </a:p>
+        </p:txBody>
+      </p:sp>
+    </p:spTree>
+    <p:extLst>
+      <p:ext uri="{BB962C8B-B14F-4D97-AF65-F5344CB8AC3E}">
+        <p14:creationId xmlns:p14="http://schemas.microsoft.com/office/powerpoint/2010/main" val="1547084163"/>
+      </p:ext>
+    </p:extLst>
+  </p:cSld>
+  <p:clrMapOvr>
+    <a:masterClrMapping/>
+  </p:clrMapOvr>
+</p:sld>
+</file>
+
+<file path=ppt/slides/slide8.xml><?xml version="1.0" encoding="utf-8"?>
+<p:sld xmlns:a="http://schemas.openxmlformats.org/drawingml/2006/main" xmlns:r="http://schemas.openxmlformats.org/officeDocument/2006/relationships" xmlns:p="http://schemas.openxmlformats.org/presentationml/2006/main">
+  <p:cSld>
+    <p:bg>
+      <p:bgPr>
+        <a:solidFill>
+          <a:schemeClr val="bg2"/>
+        </a:solidFill>
+        <a:effectLst/>
+      </p:bgPr>
+    </p:bg>
+    <p:spTree>
+      <p:nvGrpSpPr>
+        <p:cNvPr id="1" name=""/>
+        <p:cNvGrpSpPr/>
+        <p:nvPr/>
+      </p:nvGrpSpPr>
+      <p:grpSpPr>
+        <a:xfrm>
+          <a:off x="0" y="0"/>
+          <a:ext cx="0" cy="0"/>
+          <a:chOff x="0" y="0"/>
+          <a:chExt cx="0" cy="0"/>
+        </a:xfrm>
+      </p:grpSpPr>
+      <p:sp>
+        <p:nvSpPr>
+          <p:cNvPr id="18" name="Freeform 6">
+            <a:extLst>
+              <a:ext uri="{FF2B5EF4-FFF2-40B4-BE49-F238E27FC236}">
+                <a16:creationId xmlns:a16="http://schemas.microsoft.com/office/drawing/2014/main" id="{1DF61F47-37EC-408A-BDC8-E491FB5E59B8}"/>
+              </a:ext>
+              <a:ext uri="{C183D7F6-B498-43B3-948B-1728B52AA6E4}">
+                <adec:decorative xmlns:adec="http://schemas.microsoft.com/office/drawing/2017/decorative" val="1"/>
+              </a:ext>
+            </a:extLst>
+          </p:cNvPr>
+          <p:cNvSpPr>
+            <a:spLocks noGrp="1" noRot="1" noChangeAspect="1" noMove="1" noResize="1" noEditPoints="1" noAdjustHandles="1" noChangeArrowheads="1" noChangeShapeType="1" noTextEdit="1"/>
+          </p:cNvSpPr>
+          <p:nvPr>
+            <p:extLst>
+              <p:ext uri="{386F3935-93C4-4BCD-93E2-E3B085C9AB24}">
+                <p16:designElem xmlns:p16="http://schemas.microsoft.com/office/powerpoint/2015/main" val="1"/>
+              </p:ext>
+            </p:extLst>
+          </p:nvPr>
+        </p:nvSpPr>
+        <p:spPr bwMode="auto">
+          <a:xfrm>
+            <a:off x="0" y="0"/>
+            <a:ext cx="664368" cy="5143500"/>
+          </a:xfrm>
+          <a:custGeom>
+            <a:avLst/>
+            <a:gdLst/>
+            <a:ahLst/>
+            <a:cxnLst/>
+            <a:rect l="0" t="0" r="r" b="b"/>
+            <a:pathLst>
+              <a:path w="558" h="4320">
+                <a:moveTo>
+                  <a:pt x="0" y="0"/>
+                </a:moveTo>
+                <a:lnTo>
+                  <a:pt x="447" y="0"/>
+                </a:lnTo>
+                <a:lnTo>
+                  <a:pt x="448" y="43"/>
+                </a:lnTo>
+                <a:lnTo>
+                  <a:pt x="453" y="81"/>
+                </a:lnTo>
+                <a:lnTo>
+                  <a:pt x="460" y="114"/>
+                </a:lnTo>
+                <a:lnTo>
+                  <a:pt x="469" y="143"/>
+                </a:lnTo>
+                <a:lnTo>
+                  <a:pt x="479" y="169"/>
+                </a:lnTo>
+                <a:lnTo>
+                  <a:pt x="491" y="192"/>
+                </a:lnTo>
+                <a:lnTo>
+                  <a:pt x="503" y="216"/>
+                </a:lnTo>
+                <a:lnTo>
+                  <a:pt x="515" y="240"/>
+                </a:lnTo>
+                <a:lnTo>
+                  <a:pt x="525" y="263"/>
+                </a:lnTo>
+                <a:lnTo>
+                  <a:pt x="535" y="289"/>
+                </a:lnTo>
+                <a:lnTo>
+                  <a:pt x="545" y="318"/>
+                </a:lnTo>
+                <a:lnTo>
+                  <a:pt x="552" y="351"/>
+                </a:lnTo>
+                <a:lnTo>
+                  <a:pt x="556" y="389"/>
+                </a:lnTo>
+                <a:lnTo>
+                  <a:pt x="558" y="432"/>
+                </a:lnTo>
+                <a:lnTo>
+                  <a:pt x="556" y="475"/>
+                </a:lnTo>
+                <a:lnTo>
+                  <a:pt x="552" y="513"/>
+                </a:lnTo>
+                <a:lnTo>
+                  <a:pt x="545" y="546"/>
+                </a:lnTo>
+                <a:lnTo>
+                  <a:pt x="535" y="575"/>
+                </a:lnTo>
+                <a:lnTo>
+                  <a:pt x="525" y="601"/>
+                </a:lnTo>
+                <a:lnTo>
+                  <a:pt x="515" y="624"/>
+                </a:lnTo>
+                <a:lnTo>
+                  <a:pt x="503" y="648"/>
+                </a:lnTo>
+                <a:lnTo>
+                  <a:pt x="491" y="672"/>
+                </a:lnTo>
+                <a:lnTo>
+                  <a:pt x="479" y="695"/>
+                </a:lnTo>
+                <a:lnTo>
+                  <a:pt x="469" y="721"/>
+                </a:lnTo>
+                <a:lnTo>
+                  <a:pt x="460" y="750"/>
+                </a:lnTo>
+                <a:lnTo>
+                  <a:pt x="453" y="783"/>
+                </a:lnTo>
+                <a:lnTo>
+                  <a:pt x="448" y="821"/>
+                </a:lnTo>
+                <a:lnTo>
+                  <a:pt x="447" y="864"/>
+                </a:lnTo>
+                <a:lnTo>
+                  <a:pt x="448" y="907"/>
+                </a:lnTo>
+                <a:lnTo>
+                  <a:pt x="453" y="945"/>
+                </a:lnTo>
+                <a:lnTo>
+                  <a:pt x="460" y="978"/>
+                </a:lnTo>
+                <a:lnTo>
+                  <a:pt x="469" y="1007"/>
+                </a:lnTo>
+                <a:lnTo>
+                  <a:pt x="479" y="1033"/>
+                </a:lnTo>
+                <a:lnTo>
+                  <a:pt x="491" y="1056"/>
+                </a:lnTo>
+                <a:lnTo>
+                  <a:pt x="503" y="1080"/>
+                </a:lnTo>
+                <a:lnTo>
+                  <a:pt x="515" y="1104"/>
+                </a:lnTo>
+                <a:lnTo>
+                  <a:pt x="525" y="1127"/>
+                </a:lnTo>
+                <a:lnTo>
+                  <a:pt x="535" y="1153"/>
+                </a:lnTo>
+                <a:lnTo>
+                  <a:pt x="545" y="1182"/>
+                </a:lnTo>
+                <a:lnTo>
+                  <a:pt x="552" y="1215"/>
+                </a:lnTo>
+                <a:lnTo>
+                  <a:pt x="556" y="1253"/>
+                </a:lnTo>
+                <a:lnTo>
+                  <a:pt x="558" y="1296"/>
+                </a:lnTo>
+                <a:lnTo>
+                  <a:pt x="556" y="1339"/>
+                </a:lnTo>
+                <a:lnTo>
+                  <a:pt x="552" y="1377"/>
+                </a:lnTo>
+                <a:lnTo>
+                  <a:pt x="545" y="1410"/>
+                </a:lnTo>
+                <a:lnTo>
+                  <a:pt x="535" y="1439"/>
+                </a:lnTo>
+                <a:lnTo>
+                  <a:pt x="525" y="1465"/>
+                </a:lnTo>
+                <a:lnTo>
+                  <a:pt x="515" y="1488"/>
+                </a:lnTo>
+                <a:lnTo>
+                  <a:pt x="503" y="1512"/>
+                </a:lnTo>
+                <a:lnTo>
+                  <a:pt x="491" y="1536"/>
+                </a:lnTo>
+                <a:lnTo>
+                  <a:pt x="479" y="1559"/>
+                </a:lnTo>
+                <a:lnTo>
+                  <a:pt x="469" y="1585"/>
+                </a:lnTo>
+                <a:lnTo>
+                  <a:pt x="460" y="1614"/>
+                </a:lnTo>
+                <a:lnTo>
+                  <a:pt x="453" y="1647"/>
+                </a:lnTo>
+                <a:lnTo>
+                  <a:pt x="448" y="1685"/>
+                </a:lnTo>
+                <a:lnTo>
+                  <a:pt x="447" y="1728"/>
+                </a:lnTo>
+                <a:lnTo>
+                  <a:pt x="448" y="1771"/>
+                </a:lnTo>
+                <a:lnTo>
+                  <a:pt x="453" y="1809"/>
+                </a:lnTo>
+                <a:lnTo>
+                  <a:pt x="460" y="1842"/>
+                </a:lnTo>
+                <a:lnTo>
+                  <a:pt x="469" y="1871"/>
+                </a:lnTo>
+                <a:lnTo>
+                  <a:pt x="479" y="1897"/>
+                </a:lnTo>
+                <a:lnTo>
+                  <a:pt x="491" y="1920"/>
+                </a:lnTo>
+                <a:lnTo>
+                  <a:pt x="503" y="1944"/>
+                </a:lnTo>
+                <a:lnTo>
+                  <a:pt x="515" y="1968"/>
+                </a:lnTo>
+                <a:lnTo>
+                  <a:pt x="525" y="1991"/>
+                </a:lnTo>
+                <a:lnTo>
+                  <a:pt x="535" y="2017"/>
+                </a:lnTo>
+                <a:lnTo>
+                  <a:pt x="545" y="2046"/>
+                </a:lnTo>
+                <a:lnTo>
+                  <a:pt x="552" y="2079"/>
+                </a:lnTo>
+                <a:lnTo>
+                  <a:pt x="556" y="2117"/>
+                </a:lnTo>
+                <a:lnTo>
+                  <a:pt x="558" y="2159"/>
+                </a:lnTo>
+                <a:lnTo>
+                  <a:pt x="556" y="2203"/>
+                </a:lnTo>
+                <a:lnTo>
+                  <a:pt x="552" y="2241"/>
+                </a:lnTo>
+                <a:lnTo>
+                  <a:pt x="545" y="2274"/>
+                </a:lnTo>
+                <a:lnTo>
+                  <a:pt x="535" y="2303"/>
+                </a:lnTo>
+                <a:lnTo>
+                  <a:pt x="525" y="2329"/>
+                </a:lnTo>
+                <a:lnTo>
+                  <a:pt x="515" y="2352"/>
+                </a:lnTo>
+                <a:lnTo>
+                  <a:pt x="503" y="2376"/>
+                </a:lnTo>
+                <a:lnTo>
+                  <a:pt x="491" y="2400"/>
+                </a:lnTo>
+                <a:lnTo>
+                  <a:pt x="479" y="2423"/>
+                </a:lnTo>
+                <a:lnTo>
+                  <a:pt x="469" y="2449"/>
+                </a:lnTo>
+                <a:lnTo>
+                  <a:pt x="460" y="2478"/>
+                </a:lnTo>
+                <a:lnTo>
+                  <a:pt x="453" y="2511"/>
+                </a:lnTo>
+                <a:lnTo>
+                  <a:pt x="448" y="2549"/>
+                </a:lnTo>
+                <a:lnTo>
+                  <a:pt x="447" y="2592"/>
+                </a:lnTo>
+                <a:lnTo>
+                  <a:pt x="448" y="2635"/>
+                </a:lnTo>
+                <a:lnTo>
+                  <a:pt x="453" y="2673"/>
+                </a:lnTo>
+                <a:lnTo>
+                  <a:pt x="460" y="2706"/>
+                </a:lnTo>
+                <a:lnTo>
+                  <a:pt x="469" y="2735"/>
+                </a:lnTo>
+                <a:lnTo>
+                  <a:pt x="479" y="2761"/>
+                </a:lnTo>
+                <a:lnTo>
+                  <a:pt x="491" y="2784"/>
+                </a:lnTo>
+                <a:lnTo>
+                  <a:pt x="515" y="2832"/>
+                </a:lnTo>
+                <a:lnTo>
+                  <a:pt x="525" y="2855"/>
+                </a:lnTo>
+                <a:lnTo>
+                  <a:pt x="535" y="2881"/>
+                </a:lnTo>
+                <a:lnTo>
+                  <a:pt x="545" y="2910"/>
+                </a:lnTo>
+                <a:lnTo>
+                  <a:pt x="552" y="2943"/>
+                </a:lnTo>
+                <a:lnTo>
+                  <a:pt x="556" y="2981"/>
+                </a:lnTo>
+                <a:lnTo>
+                  <a:pt x="558" y="3024"/>
+                </a:lnTo>
+                <a:lnTo>
+                  <a:pt x="556" y="3067"/>
+                </a:lnTo>
+                <a:lnTo>
+                  <a:pt x="552" y="3105"/>
+                </a:lnTo>
+                <a:lnTo>
+                  <a:pt x="545" y="3138"/>
+                </a:lnTo>
+                <a:lnTo>
+                  <a:pt x="535" y="3167"/>
+                </a:lnTo>
+                <a:lnTo>
+                  <a:pt x="525" y="3193"/>
+                </a:lnTo>
+                <a:lnTo>
+                  <a:pt x="515" y="3216"/>
+                </a:lnTo>
+                <a:lnTo>
+                  <a:pt x="503" y="3240"/>
+                </a:lnTo>
+                <a:lnTo>
+                  <a:pt x="491" y="3264"/>
+                </a:lnTo>
+                <a:lnTo>
+                  <a:pt x="479" y="3287"/>
+                </a:lnTo>
+                <a:lnTo>
+                  <a:pt x="469" y="3313"/>
+                </a:lnTo>
+                <a:lnTo>
+                  <a:pt x="460" y="3342"/>
+                </a:lnTo>
+                <a:lnTo>
+                  <a:pt x="453" y="3375"/>
+                </a:lnTo>
+                <a:lnTo>
+                  <a:pt x="448" y="3413"/>
+                </a:lnTo>
+                <a:lnTo>
+                  <a:pt x="447" y="3456"/>
+                </a:lnTo>
+                <a:lnTo>
+                  <a:pt x="448" y="3499"/>
+                </a:lnTo>
+                <a:lnTo>
+                  <a:pt x="453" y="3537"/>
+                </a:lnTo>
+                <a:lnTo>
+                  <a:pt x="460" y="3570"/>
+                </a:lnTo>
+                <a:lnTo>
+                  <a:pt x="469" y="3599"/>
+                </a:lnTo>
+                <a:lnTo>
+                  <a:pt x="479" y="3625"/>
+                </a:lnTo>
+                <a:lnTo>
+                  <a:pt x="491" y="3648"/>
+                </a:lnTo>
+                <a:lnTo>
+                  <a:pt x="503" y="3672"/>
+                </a:lnTo>
+                <a:lnTo>
+                  <a:pt x="515" y="3696"/>
+                </a:lnTo>
+                <a:lnTo>
+                  <a:pt x="525" y="3719"/>
+                </a:lnTo>
+                <a:lnTo>
+                  <a:pt x="535" y="3745"/>
+                </a:lnTo>
+                <a:lnTo>
+                  <a:pt x="545" y="3774"/>
+                </a:lnTo>
+                <a:lnTo>
+                  <a:pt x="552" y="3807"/>
+                </a:lnTo>
+                <a:lnTo>
+                  <a:pt x="556" y="3845"/>
+                </a:lnTo>
+                <a:lnTo>
+                  <a:pt x="558" y="3888"/>
+                </a:lnTo>
+                <a:lnTo>
+                  <a:pt x="556" y="3931"/>
+                </a:lnTo>
+                <a:lnTo>
+                  <a:pt x="552" y="3969"/>
+                </a:lnTo>
+                <a:lnTo>
+                  <a:pt x="545" y="4002"/>
+                </a:lnTo>
+                <a:lnTo>
+                  <a:pt x="535" y="4031"/>
+                </a:lnTo>
+                <a:lnTo>
+                  <a:pt x="525" y="4057"/>
+                </a:lnTo>
+                <a:lnTo>
+                  <a:pt x="515" y="4080"/>
+                </a:lnTo>
+                <a:lnTo>
+                  <a:pt x="503" y="4104"/>
+                </a:lnTo>
+                <a:lnTo>
+                  <a:pt x="491" y="4128"/>
+                </a:lnTo>
+                <a:lnTo>
+                  <a:pt x="479" y="4151"/>
+                </a:lnTo>
+                <a:lnTo>
+                  <a:pt x="469" y="4177"/>
+                </a:lnTo>
+                <a:lnTo>
+                  <a:pt x="460" y="4206"/>
+                </a:lnTo>
+                <a:lnTo>
+                  <a:pt x="453" y="4239"/>
+                </a:lnTo>
+                <a:lnTo>
+                  <a:pt x="448" y="4277"/>
+                </a:lnTo>
+                <a:lnTo>
+                  <a:pt x="447" y="4320"/>
+                </a:lnTo>
+                <a:lnTo>
+                  <a:pt x="0" y="4320"/>
+                </a:lnTo>
+                <a:lnTo>
+                  <a:pt x="0" y="0"/>
+                </a:lnTo>
+                <a:close/>
+              </a:path>
+            </a:pathLst>
+          </a:custGeom>
+          <a:solidFill>
+            <a:schemeClr val="tx2"/>
+          </a:solidFill>
+          <a:ln w="0">
+            <a:noFill/>
+            <a:prstDash val="solid"/>
+            <a:round/>
+            <a:headEnd/>
+            <a:tailEnd/>
+          </a:ln>
+        </p:spPr>
+      </p:sp>
+      <p:sp>
+        <p:nvSpPr>
+          <p:cNvPr id="19" name="Rectangle 9">
+            <a:extLst>
+              <a:ext uri="{FF2B5EF4-FFF2-40B4-BE49-F238E27FC236}">
+                <a16:creationId xmlns:a16="http://schemas.microsoft.com/office/drawing/2014/main" id="{68157995-9098-42A2-8E36-8BA9015D759A}"/>
+              </a:ext>
+              <a:ext uri="{C183D7F6-B498-43B3-948B-1728B52AA6E4}">
+                <adec:decorative xmlns:adec="http://schemas.microsoft.com/office/drawing/2017/decorative" val="1"/>
+              </a:ext>
+            </a:extLst>
+          </p:cNvPr>
+          <p:cNvSpPr>
+            <a:spLocks noGrp="1" noRot="1" noChangeAspect="1" noMove="1" noResize="1" noEditPoints="1" noAdjustHandles="1" noChangeArrowheads="1" noChangeShapeType="1" noTextEdit="1"/>
+          </p:cNvSpPr>
+          <p:nvPr>
+            <p:extLst>
+              <p:ext uri="{386F3935-93C4-4BCD-93E2-E3B085C9AB24}">
+                <p16:designElem xmlns:p16="http://schemas.microsoft.com/office/powerpoint/2015/main" val="1"/>
+              </p:ext>
+            </p:extLst>
+          </p:nvPr>
+        </p:nvSpPr>
+        <p:spPr>
+          <a:xfrm>
+            <a:off x="8931402" y="0"/>
+            <a:ext cx="212598" cy="5143500"/>
+          </a:xfrm>
+          <a:prstGeom prst="rect">
+            <a:avLst/>
+          </a:prstGeom>
+          <a:solidFill>
+            <a:schemeClr val="accent1"/>
+          </a:solidFill>
+          <a:ln>
+            <a:noFill/>
+          </a:ln>
+        </p:spPr>
+        <p:style>
+          <a:lnRef idx="2">
+            <a:schemeClr val="accent1">
+              <a:shade val="50000"/>
+            </a:schemeClr>
+          </a:lnRef>
+          <a:fillRef idx="1">
+            <a:schemeClr val="accent1"/>
+          </a:fillRef>
+          <a:effectRef idx="0">
+            <a:schemeClr val="accent1"/>
+          </a:effectRef>
+          <a:fontRef idx="minor">
+            <a:schemeClr val="lt1"/>
+          </a:fontRef>
+        </p:style>
+      </p:sp>
+      <p:sp useBgFill="1">
+        <p:nvSpPr>
+          <p:cNvPr id="20" name="Rectangle 11">
+            <a:extLst>
+              <a:ext uri="{FF2B5EF4-FFF2-40B4-BE49-F238E27FC236}">
+                <a16:creationId xmlns:a16="http://schemas.microsoft.com/office/drawing/2014/main" id="{A98AD482-27A4-454E-8A3A-84F73CBDA7E4}"/>
+              </a:ext>
+              <a:ext uri="{C183D7F6-B498-43B3-948B-1728B52AA6E4}">
+                <adec:decorative xmlns:adec="http://schemas.microsoft.com/office/drawing/2017/decorative" val="1"/>
+              </a:ext>
+            </a:extLst>
+          </p:cNvPr>
+          <p:cNvSpPr>
+            <a:spLocks noGrp="1" noRot="1" noChangeAspect="1" noMove="1" noResize="1" noEditPoints="1" noAdjustHandles="1" noChangeArrowheads="1" noChangeShapeType="1" noTextEdit="1"/>
+          </p:cNvSpPr>
+          <p:nvPr>
+            <p:extLst>
+              <p:ext uri="{386F3935-93C4-4BCD-93E2-E3B085C9AB24}">
+                <p16:designElem xmlns:p16="http://schemas.microsoft.com/office/powerpoint/2015/main" val="1"/>
+              </p:ext>
+            </p:extLst>
+          </p:nvPr>
+        </p:nvSpPr>
+        <p:spPr>
+          <a:xfrm>
+            <a:off x="0" y="0"/>
+            <a:ext cx="9144000" cy="5143500"/>
+          </a:xfrm>
+          <a:prstGeom prst="rect">
+            <a:avLst/>
+          </a:prstGeom>
+          <a:ln>
+            <a:noFill/>
+          </a:ln>
+        </p:spPr>
+        <p:style>
+          <a:lnRef idx="2">
+            <a:schemeClr val="accent1">
+              <a:shade val="50000"/>
+            </a:schemeClr>
+          </a:lnRef>
+          <a:fillRef idx="1">
+            <a:schemeClr val="accent1"/>
+          </a:fillRef>
+          <a:effectRef idx="0">
+            <a:schemeClr val="accent1"/>
+          </a:effectRef>
+          <a:fontRef idx="minor">
+            <a:schemeClr val="lt1"/>
+          </a:fontRef>
+        </p:style>
+        <p:txBody>
+          <a:bodyPr rtlCol="0" anchor="ctr"/>
+          <a:lstStyle/>
+          <a:p>
+            <a:pPr algn="ctr"/>
+            <a:endParaRPr lang="en-US"/>
+          </a:p>
+        </p:txBody>
+      </p:sp>
+      <p:sp>
+        <p:nvSpPr>
+          <p:cNvPr id="21" name="Rectangle 13">
+            <a:extLst>
+              <a:ext uri="{FF2B5EF4-FFF2-40B4-BE49-F238E27FC236}">
+                <a16:creationId xmlns:a16="http://schemas.microsoft.com/office/drawing/2014/main" id="{322422E2-F15A-43AE-98F1-7210710B0EB8}"/>
+              </a:ext>
+              <a:ext uri="{C183D7F6-B498-43B3-948B-1728B52AA6E4}">
+                <adec:decorative xmlns:adec="http://schemas.microsoft.com/office/drawing/2017/decorative" val="1"/>
+              </a:ext>
+            </a:extLst>
+          </p:cNvPr>
+          <p:cNvSpPr>
+            <a:spLocks noGrp="1" noRot="1" noChangeAspect="1" noMove="1" noResize="1" noEditPoints="1" noAdjustHandles="1" noChangeArrowheads="1" noChangeShapeType="1" noTextEdit="1"/>
+          </p:cNvSpPr>
+          <p:nvPr>
+            <p:extLst>
+              <p:ext uri="{386F3935-93C4-4BCD-93E2-E3B085C9AB24}">
+                <p16:designElem xmlns:p16="http://schemas.microsoft.com/office/powerpoint/2015/main" val="1"/>
+              </p:ext>
+            </p:extLst>
+          </p:nvPr>
+        </p:nvSpPr>
+        <p:spPr>
+          <a:xfrm>
+            <a:off x="0" y="0"/>
+            <a:ext cx="3480257" cy="5143500"/>
+          </a:xfrm>
+          <a:prstGeom prst="rect">
+            <a:avLst/>
+          </a:prstGeom>
+          <a:solidFill>
+            <a:schemeClr val="accent1"/>
+          </a:solidFill>
+          <a:ln>
+            <a:noFill/>
+          </a:ln>
+        </p:spPr>
+        <p:style>
+          <a:lnRef idx="2">
+            <a:schemeClr val="accent1">
+              <a:shade val="50000"/>
+            </a:schemeClr>
+          </a:lnRef>
+          <a:fillRef idx="1">
+            <a:schemeClr val="accent1"/>
+          </a:fillRef>
+          <a:effectRef idx="0">
+            <a:schemeClr val="accent1"/>
+          </a:effectRef>
+          <a:fontRef idx="minor">
+            <a:schemeClr val="lt1"/>
+          </a:fontRef>
+        </p:style>
+        <p:txBody>
+          <a:bodyPr rtlCol="0" anchor="ctr"/>
+          <a:lstStyle/>
+          <a:p>
+            <a:pPr algn="ctr"/>
+            <a:endParaRPr lang="en-US"/>
+          </a:p>
+        </p:txBody>
+      </p:sp>
+      <p:sp>
+        <p:nvSpPr>
+          <p:cNvPr id="2" name="Title 1">
+            <a:extLst>
+              <a:ext uri="{FF2B5EF4-FFF2-40B4-BE49-F238E27FC236}">
+                <a16:creationId xmlns:a16="http://schemas.microsoft.com/office/drawing/2014/main" id="{062A4410-C967-9E42-9F98-2AD52D3C3F2C}"/>
+              </a:ext>
+            </a:extLst>
+          </p:cNvPr>
+          <p:cNvSpPr>
+            <a:spLocks noGrp="1"/>
+          </p:cNvSpPr>
+          <p:nvPr>
+            <p:ph type="title"/>
+          </p:nvPr>
+        </p:nvSpPr>
+        <p:spPr>
+          <a:xfrm>
+            <a:off x="938757" y="808783"/>
+            <a:ext cx="2399866" cy="3525933"/>
+          </a:xfrm>
+        </p:spPr>
+        <p:txBody>
+          <a:bodyPr vert="horz" lIns="91440" tIns="45720" rIns="91440" bIns="45720" rtlCol="0" anchor="ctr">
+            <a:normAutofit/>
+          </a:bodyPr>
+          <a:lstStyle/>
+          <a:p>
+            <a:pPr defTabSz="914400">
+              <a:spcBef>
+                <a:spcPct val="0"/>
+              </a:spcBef>
+            </a:pPr>
+            <a:r>
+              <a:rPr lang="en-US" sz="2800" dirty="0"/>
+              <a:t>Enhanced Entity Relationship</a:t>
+            </a:r>
+            <a:r>
+              <a:rPr lang="zh-CN" altLang="en-US" sz="2700" spc="200" dirty="0"/>
+              <a:t> </a:t>
+            </a:r>
+            <a:r>
+              <a:rPr lang="en-US" altLang="zh-CN" sz="2700" spc="200" dirty="0"/>
+              <a:t>diagram</a:t>
+            </a:r>
+            <a:endParaRPr lang="en-US" sz="2700" spc="200" dirty="0"/>
+          </a:p>
+        </p:txBody>
+      </p:sp>
+      <p:sp>
+        <p:nvSpPr>
+          <p:cNvPr id="22" name="Freeform 6">
+            <a:extLst>
+              <a:ext uri="{FF2B5EF4-FFF2-40B4-BE49-F238E27FC236}">
+                <a16:creationId xmlns:a16="http://schemas.microsoft.com/office/drawing/2014/main" id="{BDC8164B-5FC0-4CBD-B7AE-0CB8780FFCB3}"/>
+              </a:ext>
+              <a:ext uri="{C183D7F6-B498-43B3-948B-1728B52AA6E4}">
+                <adec:decorative xmlns:adec="http://schemas.microsoft.com/office/drawing/2017/decorative" val="1"/>
+              </a:ext>
+            </a:extLst>
+          </p:cNvPr>
+          <p:cNvSpPr>
+            <a:spLocks noGrp="1" noRot="1" noChangeAspect="1" noMove="1" noResize="1" noEditPoints="1" noAdjustHandles="1" noChangeArrowheads="1" noChangeShapeType="1" noTextEdit="1"/>
+          </p:cNvSpPr>
+          <p:nvPr>
+            <p:extLst>
+              <p:ext uri="{386F3935-93C4-4BCD-93E2-E3B085C9AB24}">
+                <p16:designElem xmlns:p16="http://schemas.microsoft.com/office/powerpoint/2015/main" val="1"/>
+              </p:ext>
+            </p:extLst>
+          </p:nvPr>
+        </p:nvSpPr>
+        <p:spPr bwMode="auto">
+          <a:xfrm>
+            <a:off x="0" y="0"/>
+            <a:ext cx="664368" cy="5143500"/>
+          </a:xfrm>
+          <a:custGeom>
+            <a:avLst/>
+            <a:gdLst/>
+            <a:ahLst/>
+            <a:cxnLst/>
+            <a:rect l="0" t="0" r="r" b="b"/>
+            <a:pathLst>
+              <a:path w="558" h="4320">
+                <a:moveTo>
+                  <a:pt x="0" y="0"/>
+                </a:moveTo>
+                <a:lnTo>
+                  <a:pt x="447" y="0"/>
+                </a:lnTo>
+                <a:lnTo>
+                  <a:pt x="448" y="43"/>
+                </a:lnTo>
+                <a:lnTo>
+                  <a:pt x="453" y="81"/>
+                </a:lnTo>
+                <a:lnTo>
+                  <a:pt x="460" y="114"/>
+                </a:lnTo>
+                <a:lnTo>
+                  <a:pt x="469" y="143"/>
+                </a:lnTo>
+                <a:lnTo>
+                  <a:pt x="479" y="169"/>
+                </a:lnTo>
+                <a:lnTo>
+                  <a:pt x="491" y="192"/>
+                </a:lnTo>
+                <a:lnTo>
+                  <a:pt x="503" y="216"/>
+                </a:lnTo>
+                <a:lnTo>
+                  <a:pt x="515" y="240"/>
+                </a:lnTo>
+                <a:lnTo>
+                  <a:pt x="525" y="263"/>
+                </a:lnTo>
+                <a:lnTo>
+                  <a:pt x="535" y="289"/>
+                </a:lnTo>
+                <a:lnTo>
+                  <a:pt x="545" y="318"/>
+                </a:lnTo>
+                <a:lnTo>
+                  <a:pt x="552" y="351"/>
+                </a:lnTo>
+                <a:lnTo>
+                  <a:pt x="556" y="389"/>
+                </a:lnTo>
+                <a:lnTo>
+                  <a:pt x="558" y="432"/>
+                </a:lnTo>
+                <a:lnTo>
+                  <a:pt x="556" y="475"/>
+                </a:lnTo>
+                <a:lnTo>
+                  <a:pt x="552" y="513"/>
+                </a:lnTo>
+                <a:lnTo>
+                  <a:pt x="545" y="546"/>
+                </a:lnTo>
+                <a:lnTo>
+                  <a:pt x="535" y="575"/>
+                </a:lnTo>
+                <a:lnTo>
+                  <a:pt x="525" y="601"/>
+                </a:lnTo>
+                <a:lnTo>
+                  <a:pt x="515" y="624"/>
+                </a:lnTo>
+                <a:lnTo>
+                  <a:pt x="503" y="648"/>
+                </a:lnTo>
+                <a:lnTo>
+                  <a:pt x="491" y="672"/>
+                </a:lnTo>
+                <a:lnTo>
+                  <a:pt x="479" y="695"/>
+                </a:lnTo>
+                <a:lnTo>
+                  <a:pt x="469" y="721"/>
+                </a:lnTo>
+                <a:lnTo>
+                  <a:pt x="460" y="750"/>
+                </a:lnTo>
+                <a:lnTo>
+                  <a:pt x="453" y="783"/>
+                </a:lnTo>
+                <a:lnTo>
+                  <a:pt x="448" y="821"/>
+                </a:lnTo>
+                <a:lnTo>
+                  <a:pt x="447" y="864"/>
+                </a:lnTo>
+                <a:lnTo>
+                  <a:pt x="448" y="907"/>
+                </a:lnTo>
+                <a:lnTo>
+                  <a:pt x="453" y="945"/>
+                </a:lnTo>
+                <a:lnTo>
+                  <a:pt x="460" y="978"/>
+                </a:lnTo>
+                <a:lnTo>
+                  <a:pt x="469" y="1007"/>
+                </a:lnTo>
+                <a:lnTo>
+                  <a:pt x="479" y="1033"/>
+                </a:lnTo>
+                <a:lnTo>
+                  <a:pt x="491" y="1056"/>
+                </a:lnTo>
+                <a:lnTo>
+                  <a:pt x="503" y="1080"/>
+                </a:lnTo>
+                <a:lnTo>
+                  <a:pt x="515" y="1104"/>
+                </a:lnTo>
+                <a:lnTo>
+                  <a:pt x="525" y="1127"/>
+                </a:lnTo>
+                <a:lnTo>
+                  <a:pt x="535" y="1153"/>
+                </a:lnTo>
+                <a:lnTo>
+                  <a:pt x="545" y="1182"/>
+                </a:lnTo>
+                <a:lnTo>
+                  <a:pt x="552" y="1215"/>
+                </a:lnTo>
+                <a:lnTo>
+                  <a:pt x="556" y="1253"/>
+                </a:lnTo>
+                <a:lnTo>
+                  <a:pt x="558" y="1296"/>
+                </a:lnTo>
+                <a:lnTo>
+                  <a:pt x="556" y="1339"/>
+                </a:lnTo>
+                <a:lnTo>
+                  <a:pt x="552" y="1377"/>
+                </a:lnTo>
+                <a:lnTo>
+                  <a:pt x="545" y="1410"/>
+                </a:lnTo>
+                <a:lnTo>
+                  <a:pt x="535" y="1439"/>
+                </a:lnTo>
+                <a:lnTo>
+                  <a:pt x="525" y="1465"/>
+                </a:lnTo>
+                <a:lnTo>
+                  <a:pt x="515" y="1488"/>
+                </a:lnTo>
+                <a:lnTo>
+                  <a:pt x="503" y="1512"/>
+                </a:lnTo>
+                <a:lnTo>
+                  <a:pt x="491" y="1536"/>
+                </a:lnTo>
+                <a:lnTo>
+                  <a:pt x="479" y="1559"/>
+                </a:lnTo>
+                <a:lnTo>
+                  <a:pt x="469" y="1585"/>
+                </a:lnTo>
+                <a:lnTo>
+                  <a:pt x="460" y="1614"/>
+                </a:lnTo>
+                <a:lnTo>
+                  <a:pt x="453" y="1647"/>
+                </a:lnTo>
+                <a:lnTo>
+                  <a:pt x="448" y="1685"/>
+                </a:lnTo>
+                <a:lnTo>
+                  <a:pt x="447" y="1728"/>
+                </a:lnTo>
+                <a:lnTo>
+                  <a:pt x="448" y="1771"/>
+                </a:lnTo>
+                <a:lnTo>
+                  <a:pt x="453" y="1809"/>
+                </a:lnTo>
+                <a:lnTo>
+                  <a:pt x="460" y="1842"/>
+                </a:lnTo>
+                <a:lnTo>
+                  <a:pt x="469" y="1871"/>
+                </a:lnTo>
+                <a:lnTo>
+                  <a:pt x="479" y="1897"/>
+                </a:lnTo>
+                <a:lnTo>
+                  <a:pt x="491" y="1920"/>
+                </a:lnTo>
+                <a:lnTo>
+                  <a:pt x="503" y="1944"/>
+                </a:lnTo>
+                <a:lnTo>
+                  <a:pt x="515" y="1968"/>
+                </a:lnTo>
+                <a:lnTo>
+                  <a:pt x="525" y="1991"/>
+                </a:lnTo>
+                <a:lnTo>
+                  <a:pt x="535" y="2017"/>
+                </a:lnTo>
+                <a:lnTo>
+                  <a:pt x="545" y="2046"/>
+                </a:lnTo>
+                <a:lnTo>
+                  <a:pt x="552" y="2079"/>
+                </a:lnTo>
+                <a:lnTo>
+                  <a:pt x="556" y="2117"/>
+                </a:lnTo>
+                <a:lnTo>
+                  <a:pt x="558" y="2159"/>
+                </a:lnTo>
+                <a:lnTo>
+                  <a:pt x="556" y="2203"/>
+                </a:lnTo>
+                <a:lnTo>
+                  <a:pt x="552" y="2241"/>
+                </a:lnTo>
+                <a:lnTo>
+                  <a:pt x="545" y="2274"/>
+                </a:lnTo>
+                <a:lnTo>
+                  <a:pt x="535" y="2303"/>
+                </a:lnTo>
+                <a:lnTo>
+                  <a:pt x="525" y="2329"/>
+                </a:lnTo>
+                <a:lnTo>
+                  <a:pt x="515" y="2352"/>
+                </a:lnTo>
+                <a:lnTo>
+                  <a:pt x="503" y="2376"/>
+                </a:lnTo>
+                <a:lnTo>
+                  <a:pt x="491" y="2400"/>
+                </a:lnTo>
+                <a:lnTo>
+                  <a:pt x="479" y="2423"/>
+                </a:lnTo>
+                <a:lnTo>
+                  <a:pt x="469" y="2449"/>
+                </a:lnTo>
+                <a:lnTo>
+                  <a:pt x="460" y="2478"/>
+                </a:lnTo>
+                <a:lnTo>
+                  <a:pt x="453" y="2511"/>
+                </a:lnTo>
+                <a:lnTo>
+                  <a:pt x="448" y="2549"/>
+                </a:lnTo>
+                <a:lnTo>
+                  <a:pt x="447" y="2592"/>
+                </a:lnTo>
+                <a:lnTo>
+                  <a:pt x="448" y="2635"/>
+                </a:lnTo>
+                <a:lnTo>
+                  <a:pt x="453" y="2673"/>
+                </a:lnTo>
+                <a:lnTo>
+                  <a:pt x="460" y="2706"/>
+                </a:lnTo>
+                <a:lnTo>
+                  <a:pt x="469" y="2735"/>
+                </a:lnTo>
+                <a:lnTo>
+                  <a:pt x="479" y="2761"/>
+                </a:lnTo>
+                <a:lnTo>
+                  <a:pt x="491" y="2784"/>
+                </a:lnTo>
+                <a:lnTo>
+                  <a:pt x="515" y="2832"/>
+                </a:lnTo>
+                <a:lnTo>
+                  <a:pt x="525" y="2855"/>
+                </a:lnTo>
+                <a:lnTo>
+                  <a:pt x="535" y="2881"/>
+                </a:lnTo>
+                <a:lnTo>
+                  <a:pt x="545" y="2910"/>
+                </a:lnTo>
+                <a:lnTo>
+                  <a:pt x="552" y="2943"/>
+                </a:lnTo>
+                <a:lnTo>
+                  <a:pt x="556" y="2981"/>
+                </a:lnTo>
+                <a:lnTo>
+                  <a:pt x="558" y="3024"/>
+                </a:lnTo>
+                <a:lnTo>
+                  <a:pt x="556" y="3067"/>
+                </a:lnTo>
+                <a:lnTo>
+                  <a:pt x="552" y="3105"/>
+                </a:lnTo>
+                <a:lnTo>
+                  <a:pt x="545" y="3138"/>
+                </a:lnTo>
+                <a:lnTo>
+                  <a:pt x="535" y="3167"/>
+                </a:lnTo>
+                <a:lnTo>
+                  <a:pt x="525" y="3193"/>
+                </a:lnTo>
+                <a:lnTo>
+                  <a:pt x="515" y="3216"/>
+                </a:lnTo>
+                <a:lnTo>
+                  <a:pt x="503" y="3240"/>
+                </a:lnTo>
+                <a:lnTo>
+                  <a:pt x="491" y="3264"/>
+                </a:lnTo>
+                <a:lnTo>
+                  <a:pt x="479" y="3287"/>
+                </a:lnTo>
+                <a:lnTo>
+                  <a:pt x="469" y="3313"/>
+                </a:lnTo>
+                <a:lnTo>
+                  <a:pt x="460" y="3342"/>
+                </a:lnTo>
+                <a:lnTo>
+                  <a:pt x="453" y="3375"/>
+                </a:lnTo>
+                <a:lnTo>
+                  <a:pt x="448" y="3413"/>
+                </a:lnTo>
+                <a:lnTo>
+                  <a:pt x="447" y="3456"/>
+                </a:lnTo>
+                <a:lnTo>
+                  <a:pt x="448" y="3499"/>
+                </a:lnTo>
+                <a:lnTo>
+                  <a:pt x="453" y="3537"/>
+                </a:lnTo>
+                <a:lnTo>
+                  <a:pt x="460" y="3570"/>
+                </a:lnTo>
+                <a:lnTo>
+                  <a:pt x="469" y="3599"/>
+                </a:lnTo>
+                <a:lnTo>
+                  <a:pt x="479" y="3625"/>
+                </a:lnTo>
+                <a:lnTo>
+                  <a:pt x="491" y="3648"/>
+                </a:lnTo>
+                <a:lnTo>
+                  <a:pt x="503" y="3672"/>
+                </a:lnTo>
+                <a:lnTo>
+                  <a:pt x="515" y="3696"/>
+                </a:lnTo>
+                <a:lnTo>
+                  <a:pt x="525" y="3719"/>
+                </a:lnTo>
+                <a:lnTo>
+                  <a:pt x="535" y="3745"/>
+                </a:lnTo>
+                <a:lnTo>
+                  <a:pt x="545" y="3774"/>
+                </a:lnTo>
+                <a:lnTo>
+                  <a:pt x="552" y="3807"/>
+                </a:lnTo>
+                <a:lnTo>
+                  <a:pt x="556" y="3845"/>
+                </a:lnTo>
+                <a:lnTo>
+                  <a:pt x="558" y="3888"/>
+                </a:lnTo>
+                <a:lnTo>
+                  <a:pt x="556" y="3931"/>
+                </a:lnTo>
+                <a:lnTo>
+                  <a:pt x="552" y="3969"/>
+                </a:lnTo>
+                <a:lnTo>
+                  <a:pt x="545" y="4002"/>
+                </a:lnTo>
+                <a:lnTo>
+                  <a:pt x="535" y="4031"/>
+                </a:lnTo>
+                <a:lnTo>
+                  <a:pt x="525" y="4057"/>
+                </a:lnTo>
+                <a:lnTo>
+                  <a:pt x="515" y="4080"/>
+                </a:lnTo>
+                <a:lnTo>
+                  <a:pt x="503" y="4104"/>
+                </a:lnTo>
+                <a:lnTo>
+                  <a:pt x="491" y="4128"/>
+                </a:lnTo>
+                <a:lnTo>
+                  <a:pt x="479" y="4151"/>
+                </a:lnTo>
+                <a:lnTo>
+                  <a:pt x="469" y="4177"/>
+                </a:lnTo>
+                <a:lnTo>
+                  <a:pt x="460" y="4206"/>
+                </a:lnTo>
+                <a:lnTo>
+                  <a:pt x="453" y="4239"/>
+                </a:lnTo>
+                <a:lnTo>
+                  <a:pt x="448" y="4277"/>
+                </a:lnTo>
+                <a:lnTo>
+                  <a:pt x="447" y="4320"/>
+                </a:lnTo>
+                <a:lnTo>
+                  <a:pt x="0" y="4320"/>
+                </a:lnTo>
+                <a:lnTo>
+                  <a:pt x="0" y="0"/>
+                </a:lnTo>
+                <a:close/>
+              </a:path>
+            </a:pathLst>
+          </a:custGeom>
+          <a:solidFill>
+            <a:schemeClr val="accent1">
+              <a:lumMod val="75000"/>
+              <a:alpha val="70000"/>
+            </a:schemeClr>
+          </a:solidFill>
+          <a:ln w="0">
+            <a:noFill/>
+            <a:prstDash val="solid"/>
+            <a:round/>
+            <a:headEnd/>
+            <a:tailEnd/>
+          </a:ln>
+        </p:spPr>
+      </p:sp>
+    </p:spTree>
+    <p:extLst>
+      <p:ext uri="{BB962C8B-B14F-4D97-AF65-F5344CB8AC3E}">
+        <p14:creationId xmlns:p14="http://schemas.microsoft.com/office/powerpoint/2010/main" val="1626525605"/>
+      </p:ext>
+    </p:extLst>
+  </p:cSld>
+  <p:clrMapOvr>
+    <a:masterClrMapping/>
+  </p:clrMapOvr>
+</p:sld>
+</file>
+
 <file path=ppt/theme/theme1.xml><?xml version="1.0" encoding="utf-8"?>
 <a:theme xmlns:a="http://schemas.openxmlformats.org/drawingml/2006/main" name="Badge">
   <a:themeElements>

</xml_diff>